<commit_message>
Added link to github project in slides
</commit_message>
<xml_diff>
--- a/Intro to Android App Development.pptx
+++ b/Intro to Android App Development.pptx
@@ -209,7 +209,7 @@
           <a:p>
             <a:fld id="{E3BF2327-D0FC-47B1-8C8D-F32169E7219D}" type="datetimeFigureOut">
               <a:rPr lang="en-US" smtClean="0"/>
-              <a:t>3/25/2015</a:t>
+              <a:t>3/26/2015</a:t>
             </a:fld>
             <a:endParaRPr lang="en-US"/>
           </a:p>
@@ -942,7 +942,7 @@
           <a:p>
             <a:fld id="{ECD19FB2-3AAB-4D03-B13A-2960828C78E3}" type="datetimeFigureOut">
               <a:rPr lang="en-US" smtClean="0"/>
-              <a:t>3/25/2015</a:t>
+              <a:t>3/26/2015</a:t>
             </a:fld>
             <a:endParaRPr lang="en-US" dirty="0"/>
           </a:p>
@@ -1158,7 +1158,7 @@
           <a:p>
             <a:fld id="{0DED02AE-B9A4-47BD-AF8E-97E16144138B}" type="datetimeFigureOut">
               <a:rPr lang="en-US" smtClean="0"/>
-              <a:t>3/25/2015</a:t>
+              <a:t>3/26/2015</a:t>
             </a:fld>
             <a:endParaRPr lang="en-US" dirty="0"/>
           </a:p>
@@ -1343,7 +1343,7 @@
           <a:p>
             <a:fld id="{CF0FD78B-DB02-4362-BCDC-98A55456977C}" type="datetimeFigureOut">
               <a:rPr lang="en-US" smtClean="0"/>
-              <a:t>3/25/2015</a:t>
+              <a:t>3/26/2015</a:t>
             </a:fld>
             <a:endParaRPr lang="en-US" dirty="0"/>
           </a:p>
@@ -1518,7 +1518,7 @@
           <a:p>
             <a:fld id="{99916976-5D93-46E4-A98A-FAD63E4D0EA8}" type="datetimeFigureOut">
               <a:rPr lang="en-US" smtClean="0"/>
-              <a:t>3/25/2015</a:t>
+              <a:t>3/26/2015</a:t>
             </a:fld>
             <a:endParaRPr lang="en-US" dirty="0"/>
           </a:p>
@@ -1777,7 +1777,7 @@
           <a:p>
             <a:fld id="{0F39F4F5-F4D2-4D2A-AB60-88D37ADCB869}" type="datetimeFigureOut">
               <a:rPr lang="en-US" smtClean="0"/>
-              <a:t>3/25/2015</a:t>
+              <a:t>3/26/2015</a:t>
             </a:fld>
             <a:endParaRPr lang="en-US" dirty="0"/>
           </a:p>
@@ -2108,7 +2108,7 @@
           <a:p>
             <a:fld id="{D23BC6CE-6D1E-47E5-8859-F31AC5380EB2}" type="datetimeFigureOut">
               <a:rPr lang="en-US" smtClean="0"/>
-              <a:t>3/25/2015</a:t>
+              <a:t>3/26/2015</a:t>
             </a:fld>
             <a:endParaRPr lang="en-US" dirty="0"/>
           </a:p>
@@ -2564,7 +2564,7 @@
           <a:p>
             <a:fld id="{B1B4E7C4-4DA4-404D-9965-B13F2DD7D8BF}" type="datetimeFigureOut">
               <a:rPr lang="en-US" smtClean="0"/>
-              <a:t>3/25/2015</a:t>
+              <a:t>3/26/2015</a:t>
             </a:fld>
             <a:endParaRPr lang="en-US" dirty="0"/>
           </a:p>
@@ -2687,7 +2687,7 @@
           <a:p>
             <a:fld id="{476FB7AA-4A53-424F-AD41-70827B6504BA}" type="datetimeFigureOut">
               <a:rPr lang="en-US" smtClean="0"/>
-              <a:t>3/25/2015</a:t>
+              <a:t>3/26/2015</a:t>
             </a:fld>
             <a:endParaRPr lang="en-US" dirty="0"/>
           </a:p>
@@ -2787,7 +2787,7 @@
           <a:p>
             <a:fld id="{E7884882-FB12-4BC8-9960-9AD8104D7FAE}" type="datetimeFigureOut">
               <a:rPr lang="en-US" smtClean="0"/>
-              <a:t>3/25/2015</a:t>
+              <a:t>3/26/2015</a:t>
             </a:fld>
             <a:endParaRPr lang="en-US" dirty="0"/>
           </a:p>
@@ -3079,7 +3079,7 @@
           <a:p>
             <a:fld id="{F7D1BD23-6E54-4D9D-AD88-A2813C73CC25}" type="datetimeFigureOut">
               <a:rPr lang="en-US" smtClean="0"/>
-              <a:t>3/25/2015</a:t>
+              <a:t>3/26/2015</a:t>
             </a:fld>
             <a:endParaRPr lang="en-US" dirty="0"/>
           </a:p>
@@ -3402,7 +3402,7 @@
           <a:p>
             <a:fld id="{1471A834-4F3C-4AF9-9C74-05EC35A0F292}" type="datetimeFigureOut">
               <a:rPr lang="en-US" smtClean="0"/>
-              <a:t>3/25/2015</a:t>
+              <a:t>3/26/2015</a:t>
             </a:fld>
             <a:endParaRPr lang="en-US" dirty="0"/>
           </a:p>
@@ -3659,7 +3659,7 @@
           <a:p>
             <a:fld id="{51CF1133-3259-4C45-BABA-5B62D9C6F78D}" type="datetimeFigureOut">
               <a:rPr lang="en-US" smtClean="0"/>
-              <a:t>3/25/2015</a:t>
+              <a:t>3/26/2015</a:t>
             </a:fld>
             <a:endParaRPr lang="en-US" dirty="0"/>
           </a:p>
@@ -4220,11 +4220,11 @@
   <p:clrMapOvr>
     <a:masterClrMapping/>
   </p:clrMapOvr>
-  <mc:AlternateContent xmlns:mc="http://schemas.openxmlformats.org/markup-compatibility/2006">
-    <mc:Choice xmlns:p14="http://schemas.microsoft.com/office/powerpoint/2010/main" Requires="p14">
+  <mc:AlternateContent xmlns:mc="http://schemas.openxmlformats.org/markup-compatibility/2006" xmlns:p14="http://schemas.microsoft.com/office/powerpoint/2010/main">
+    <mc:Choice Requires="p14">
       <p:transition spd="slow" p14:dur="2000"/>
     </mc:Choice>
-    <mc:Fallback>
+    <mc:Fallback xmlns="">
       <p:transition spd="slow"/>
     </mc:Fallback>
   </mc:AlternateContent>
@@ -4722,6 +4722,30 @@
               </a:rPr>
               <a:t>harrycheung/mobile-app-performance-redux-e512be94f976</a:t>
             </a:r>
+            <a:endParaRPr lang="en-US" dirty="0"/>
+          </a:p>
+          <a:p>
+            <a:pPr marL="0" indent="0">
+              <a:buNone/>
+            </a:pPr>
+            <a:endParaRPr lang="en-US" dirty="0"/>
+          </a:p>
+          <a:p>
+            <a:pPr marL="0" indent="0">
+              <a:buNone/>
+            </a:pPr>
+            <a:r>
+              <a:rPr lang="en-US" dirty="0">
+                <a:hlinkClick r:id="rId5"/>
+              </a:rPr>
+              <a:t>http://benromano.com</a:t>
+            </a:r>
+            <a:r>
+              <a:rPr lang="en-US" dirty="0" smtClean="0">
+                <a:hlinkClick r:id="rId5"/>
+              </a:rPr>
+              <a:t>/</a:t>
+            </a:r>
             <a:endParaRPr lang="en-US" dirty="0" smtClean="0"/>
           </a:p>
           <a:p>
@@ -4848,6 +4872,40 @@
               <a:rPr lang="en-US" dirty="0" err="1" smtClean="0"/>
               <a:t>Xamarin.Android</a:t>
             </a:r>
+            <a:endParaRPr lang="en-US" dirty="0" smtClean="0"/>
+          </a:p>
+          <a:p>
+            <a:endParaRPr lang="en-US" dirty="0"/>
+          </a:p>
+          <a:p>
+            <a:r>
+              <a:rPr lang="en-US" dirty="0" smtClean="0"/>
+              <a:t>Example Code to follow along is at </a:t>
+            </a:r>
+            <a:r>
+              <a:rPr lang="en-US" dirty="0" smtClean="0">
+                <a:hlinkClick r:id="rId2"/>
+              </a:rPr>
+              <a:t>http</a:t>
+            </a:r>
+            <a:r>
+              <a:rPr lang="en-US" dirty="0">
+                <a:hlinkClick r:id="rId2"/>
+              </a:rPr>
+              <a:t>://</a:t>
+            </a:r>
+            <a:r>
+              <a:rPr lang="en-US" dirty="0" smtClean="0">
+                <a:hlinkClick r:id="rId2"/>
+              </a:rPr>
+              <a:t>goo.gl/bRc1bs</a:t>
+            </a:r>
+            <a:endParaRPr lang="en-US" dirty="0" smtClean="0"/>
+          </a:p>
+          <a:p>
+            <a:pPr marL="0" indent="0">
+              <a:buNone/>
+            </a:pPr>
             <a:endParaRPr lang="en-US" dirty="0"/>
           </a:p>
         </p:txBody>
@@ -4862,11 +4920,11 @@
   <p:clrMapOvr>
     <a:masterClrMapping/>
   </p:clrMapOvr>
-  <mc:AlternateContent xmlns:mc="http://schemas.openxmlformats.org/markup-compatibility/2006">
-    <mc:Choice xmlns:p14="http://schemas.microsoft.com/office/powerpoint/2010/main" Requires="p14">
+  <mc:AlternateContent xmlns:mc="http://schemas.openxmlformats.org/markup-compatibility/2006" xmlns:p14="http://schemas.microsoft.com/office/powerpoint/2010/main">
+    <mc:Choice Requires="p14">
       <p:transition spd="slow" p14:dur="2000"/>
     </mc:Choice>
-    <mc:Fallback>
+    <mc:Fallback xmlns="">
       <p:transition spd="slow"/>
     </mc:Fallback>
   </mc:AlternateContent>
@@ -5235,11 +5293,7 @@
           <a:p>
             <a:r>
               <a:rPr lang="en-US" dirty="0" smtClean="0"/>
-              <a:t>Runs on </a:t>
-            </a:r>
-            <a:r>
-              <a:rPr lang="en-US" dirty="0" smtClean="0"/>
-              <a:t>Java</a:t>
+              <a:t>Runs on Java</a:t>
             </a:r>
           </a:p>
           <a:p>
@@ -5317,11 +5371,11 @@
   <p:clrMapOvr>
     <a:masterClrMapping/>
   </p:clrMapOvr>
-  <mc:AlternateContent xmlns:mc="http://schemas.openxmlformats.org/markup-compatibility/2006">
-    <mc:Choice xmlns:p14="http://schemas.microsoft.com/office/powerpoint/2010/main" Requires="p14">
+  <mc:AlternateContent xmlns:mc="http://schemas.openxmlformats.org/markup-compatibility/2006" xmlns:p14="http://schemas.microsoft.com/office/powerpoint/2010/main">
+    <mc:Choice Requires="p14">
       <p:transition spd="slow" p14:dur="2000"/>
     </mc:Choice>
-    <mc:Fallback>
+    <mc:Fallback xmlns="">
       <p:transition spd="slow"/>
     </mc:Fallback>
   </mc:AlternateContent>
@@ -5626,11 +5680,11 @@
   <p:clrMapOvr>
     <a:masterClrMapping/>
   </p:clrMapOvr>
-  <mc:AlternateContent xmlns:mc="http://schemas.openxmlformats.org/markup-compatibility/2006">
-    <mc:Choice xmlns:p14="http://schemas.microsoft.com/office/powerpoint/2010/main" Requires="p14">
+  <mc:AlternateContent xmlns:mc="http://schemas.openxmlformats.org/markup-compatibility/2006" xmlns:p14="http://schemas.microsoft.com/office/powerpoint/2010/main">
+    <mc:Choice Requires="p14">
       <p:transition spd="slow" p14:dur="2000"/>
     </mc:Choice>
-    <mc:Fallback>
+    <mc:Fallback xmlns="">
       <p:transition spd="slow"/>
     </mc:Fallback>
   </mc:AlternateContent>
@@ -5862,11 +5916,7 @@
           <a:p>
             <a:r>
               <a:rPr lang="en-US" dirty="0" smtClean="0"/>
-              <a:t>Need </a:t>
-            </a:r>
-            <a:r>
-              <a:rPr lang="en-US" dirty="0" smtClean="0"/>
-              <a:t>the Android SDK</a:t>
+              <a:t>Need the Android SDK</a:t>
             </a:r>
           </a:p>
           <a:p>
@@ -5880,23 +5930,7 @@
             <a:pPr lvl="1"/>
             <a:r>
               <a:rPr lang="en-US" dirty="0" smtClean="0"/>
-              <a:t>Visual Studio requires </a:t>
-            </a:r>
-            <a:r>
-              <a:rPr lang="en-US" dirty="0" smtClean="0"/>
-              <a:t>you to </a:t>
-            </a:r>
-            <a:r>
-              <a:rPr lang="en-US" dirty="0" smtClean="0"/>
-              <a:t>download </a:t>
-            </a:r>
-            <a:r>
-              <a:rPr lang="en-US" dirty="0" smtClean="0"/>
-              <a:t>Xamarin </a:t>
-            </a:r>
-            <a:r>
-              <a:rPr lang="en-US" dirty="0" smtClean="0"/>
-              <a:t>Studio</a:t>
+              <a:t>Visual Studio requires you to download Xamarin Studio</a:t>
             </a:r>
           </a:p>
           <a:p>
@@ -5978,11 +6012,11 @@
   <p:clrMapOvr>
     <a:masterClrMapping/>
   </p:clrMapOvr>
-  <mc:AlternateContent xmlns:mc="http://schemas.openxmlformats.org/markup-compatibility/2006">
-    <mc:Choice xmlns:p14="http://schemas.microsoft.com/office/powerpoint/2010/main" Requires="p14">
+  <mc:AlternateContent xmlns:mc="http://schemas.openxmlformats.org/markup-compatibility/2006" xmlns:p14="http://schemas.microsoft.com/office/powerpoint/2010/main">
+    <mc:Choice Requires="p14">
       <p:transition spd="slow" p14:dur="2000"/>
     </mc:Choice>
-    <mc:Fallback>
+    <mc:Fallback xmlns="">
       <p:transition spd="slow"/>
     </mc:Fallback>
   </mc:AlternateContent>

</xml_diff>